<commit_message>
Study and Draw some stuffs
</commit_message>
<xml_diff>
--- a/CMPE 321.01 (Computer Architecture)/labs/lab-01.pptx
+++ b/CMPE 321.01 (Computer Architecture)/labs/lab-01.pptx
@@ -116,7 +116,124 @@
       </a:defRPr>
     </a:lvl9pPr>
   </p:defaultTextStyle>
+  <p:extLst>
+    <p:ext uri="{EFAFB233-063F-42B5-8137-9DF3F51BA10A}">
+      <p15:sldGuideLst xmlns:p15="http://schemas.microsoft.com/office/powerpoint/2012/main"/>
+    </p:ext>
+  </p:extLst>
 </p:presentation>
+</file>
+
+<file path=ppt/ink/ink1.xml><?xml version="1.0" encoding="utf-8"?>
+<inkml:ink xmlns:inkml="http://www.w3.org/2003/InkML">
+  <inkml:definitions>
+    <inkml:context xml:id="ctx0">
+      <inkml:inkSource xml:id="inkSrc0">
+        <inkml:traceFormat>
+          <inkml:channel name="X" type="integer" min="-2.14748E9" max="2.14748E9" units="cm"/>
+          <inkml:channel name="Y" type="integer" min="-2.14748E9" max="2.14748E9" units="cm"/>
+        </inkml:traceFormat>
+        <inkml:channelProperties>
+          <inkml:channelProperty channel="X" name="resolution" value="1000" units="1/cm"/>
+          <inkml:channelProperty channel="Y" name="resolution" value="1000" units="1/cm"/>
+        </inkml:channelProperties>
+      </inkml:inkSource>
+      <inkml:timestamp xml:id="ts0" timeString="2018-11-11T18:14:15.411"/>
+    </inkml:context>
+    <inkml:brush xml:id="br0">
+      <inkml:brushProperty name="width" value="0.3" units="cm"/>
+      <inkml:brushProperty name="height" value="0.6" units="cm"/>
+      <inkml:brushProperty name="color" value="#FF2500"/>
+      <inkml:brushProperty name="tip" value="rectangle"/>
+      <inkml:brushProperty name="rasterOp" value="maskPen"/>
+    </inkml:brush>
+  </inkml:definitions>
+  <inkml:trace contextRef="#ctx0" brushRef="#br0">0 0,'50'0,"4"0,-22 0,28 0,-25 0,36 0,-31 0,27 0,-4 0,7 0,7 0,-7 0,30 0,-37 0,-10 0,0 0,13 0,11 0,-8 0,-14 0,-1 0,-12 0,-1 0,-10 0,-2 0,-5 0,0 0,1 0,-1 0,-4 0,3 0,-3 0,5 0,-1 0,0 0,0 0,0 0,1 0,-1 0,0 0,5 0,-3 0,3 0,0 0,-3 0,8 0,-9 0,10 0,-5 0,0 0,5 0,-10 0,4 0,-4 0,-1 0,0 0,0 0,-3 0,2 0,-7 0,3 0,0 0,-4 0,9 0,2 0,0 0,5 0,-7 0,1 0,-5 0,3 0,-3 0,4 0,1 0,-1 0,0 0,-4 0,3 0,-7 0,3 0,-4 0,0 0,4 0,-3 0,7 0,-3 0,9 0,2 0,4 0,6 0,-4 0,9 0,-9 0,9 0,-9 0,9 0,-9 0,4 0,-11 0,4 0,-8 0,8 0,-9 0,0 0,-2 0,-7 0,3 0,-4 0,0 0,5 0,-7 0,6 0,-5 0,1 0,4 0,-4 0,1 0</inkml:trace>
+</inkml:ink>
+</file>
+
+<file path=ppt/ink/ink2.xml><?xml version="1.0" encoding="utf-8"?>
+<inkml:ink xmlns:inkml="http://www.w3.org/2003/InkML">
+  <inkml:definitions>
+    <inkml:context xml:id="ctx0">
+      <inkml:inkSource xml:id="inkSrc0">
+        <inkml:traceFormat>
+          <inkml:channel name="X" type="integer" min="-2.14748E9" max="2.14748E9" units="cm"/>
+          <inkml:channel name="Y" type="integer" min="-2.14748E9" max="2.14748E9" units="cm"/>
+        </inkml:traceFormat>
+        <inkml:channelProperties>
+          <inkml:channelProperty channel="X" name="resolution" value="1000" units="1/cm"/>
+          <inkml:channelProperty channel="Y" name="resolution" value="1000" units="1/cm"/>
+        </inkml:channelProperties>
+      </inkml:inkSource>
+      <inkml:timestamp xml:id="ts0" timeString="2018-11-11T18:14:23.891"/>
+    </inkml:context>
+    <inkml:brush xml:id="br0">
+      <inkml:brushProperty name="width" value="0.3" units="cm"/>
+      <inkml:brushProperty name="height" value="0.6" units="cm"/>
+      <inkml:brushProperty name="color" value="#FF2500"/>
+      <inkml:brushProperty name="tip" value="rectangle"/>
+      <inkml:brushProperty name="rasterOp" value="maskPen"/>
+    </inkml:brush>
+  </inkml:definitions>
+  <inkml:trace contextRef="#ctx0" brushRef="#br0">1 0,'46'0,"-1"0,-30 0,14 0,-8 0,8 0,0 0,2 0,4 0,0 0,1 0,-1 0,0 0,-4 0,3 0,-8 0,-2 0,-5 0,-4 0,0 0,3 0,-3 0,2 0,0 0,2 0,4 0,-5 0,1 0,0 0,1 0,5 0,-1 0,0 0,0 0,1 0,4 0,-4 0,9 0,-3 0,-1 0,4 0,-3 0,-1 0,4 0,-4 0,1 0,-2 0,0 0,-3 0,3 0,-5 0,-4 0,3 0,-7 0,7 0,-7 0,3 0,0 0,-3 0,7 0,-7 0,3 0,0 0,-3 0,7 0,-8 0,8 0,-7 0,7 0,-7 0,7 0,-7 0,7 0,-7 0,8 0,-9 0,9 4,-9-3,9 2,-8-3,7 4,-3-3,4 2,0 1,1-3,-1 2,-4-3,3 0,-7 4,3-3,-4 2,0-3,6 0,-4 3,4-2,-3 2,-3-3,3 0,-3 3,2-2,-1 3,2-4,-4 0,1 3,3-2,-3 2,3-3,-3 0,0 0,2 3,-1-2,5 2,-6-3,-1 0,7 0,-12 3,14-2,-8 5,0-5,4 2,-7 0,4-2,-1 5,1-3</inkml:trace>
+</inkml:ink>
+</file>
+
+<file path=ppt/ink/ink3.xml><?xml version="1.0" encoding="utf-8"?>
+<inkml:ink xmlns:inkml="http://www.w3.org/2003/InkML">
+  <inkml:definitions>
+    <inkml:context xml:id="ctx0">
+      <inkml:inkSource xml:id="inkSrc0">
+        <inkml:traceFormat>
+          <inkml:channel name="X" type="integer" min="-2.14748E9" max="2.14748E9" units="cm"/>
+          <inkml:channel name="Y" type="integer" min="-2.14748E9" max="2.14748E9" units="cm"/>
+        </inkml:traceFormat>
+        <inkml:channelProperties>
+          <inkml:channelProperty channel="X" name="resolution" value="1000" units="1/cm"/>
+          <inkml:channelProperty channel="Y" name="resolution" value="1000" units="1/cm"/>
+        </inkml:channelProperties>
+      </inkml:inkSource>
+      <inkml:timestamp xml:id="ts0" timeString="2018-11-11T18:15:49.539"/>
+    </inkml:context>
+    <inkml:brush xml:id="br0">
+      <inkml:brushProperty name="width" value="0.3" units="cm"/>
+      <inkml:brushProperty name="height" value="0.6" units="cm"/>
+      <inkml:brushProperty name="color" value="#FF2500"/>
+      <inkml:brushProperty name="tip" value="rectangle"/>
+      <inkml:brushProperty name="rasterOp" value="maskPen"/>
+    </inkml:brush>
+  </inkml:definitions>
+  <inkml:trace contextRef="#ctx0" brushRef="#br0">8 998,'-4'-55,"1"-4,3-4,0 0,0-6,0 7,0-6,8 16,13-15,11 14,22-3,-2-3,19 12,-8-2,15 9,-13 3,-8 15,9-3,-15 14,40-11,-17 15,19-4,-17 11,1 0,7 0,-12 0,13 20,-33-7,33 38,-43-25,31 30,-33-21,6 16,-11-7,-1 1,-11-4,0 1,-9-5,0 3,-6-4,1-1,-4 6,-1 1,-4 0,0 11,0-9,0 10,0-6,-9-1,-2 7,-8-4,-5 4,-1-7,-8-3,3 3,-14 4,8-6,-5 0,10-14,4-5,-5 2,4-1,-3 0,-1 1,3 4,-8-3,7 8,-7-3,8-1,-8 4,4-8,0 3,1-5,1 1,4-6,-4-1,2-8,7 2,-6-6,12 2,-3-3,8-1,-3 0,3 6,3-2,-1 6,8 3,-2 0,3 3,0 0,0-3,0 4,0 0,0 1,0 4,0-8,0 12,0-11,0 7,0-5,0 0,0 5,0 2,4-1,0 4,1-4,3 5,-7-4,7 3,-7-9,6 10,-2-14,-1 7,0-12,-4 3,0-5,0 0,0-1</inkml:trace>
+</inkml:ink>
+</file>
+
+<file path=ppt/ink/ink4.xml><?xml version="1.0" encoding="utf-8"?>
+<inkml:ink xmlns:inkml="http://www.w3.org/2003/InkML">
+  <inkml:definitions>
+    <inkml:context xml:id="ctx0">
+      <inkml:inkSource xml:id="inkSrc0">
+        <inkml:traceFormat>
+          <inkml:channel name="X" type="integer" min="-2.14748E9" max="2.14748E9" units="cm"/>
+          <inkml:channel name="Y" type="integer" min="-2.14748E9" max="2.14748E9" units="cm"/>
+        </inkml:traceFormat>
+        <inkml:channelProperties>
+          <inkml:channelProperty channel="X" name="resolution" value="1000" units="1/cm"/>
+          <inkml:channelProperty channel="Y" name="resolution" value="1000" units="1/cm"/>
+        </inkml:channelProperties>
+      </inkml:inkSource>
+      <inkml:timestamp xml:id="ts0" timeString="2018-11-11T18:15:50.789"/>
+    </inkml:context>
+    <inkml:brush xml:id="br0">
+      <inkml:brushProperty name="width" value="0.3" units="cm"/>
+      <inkml:brushProperty name="height" value="0.6" units="cm"/>
+      <inkml:brushProperty name="color" value="#FF2500"/>
+      <inkml:brushProperty name="tip" value="rectangle"/>
+      <inkml:brushProperty name="rasterOp" value="maskPen"/>
+    </inkml:brush>
+  </inkml:definitions>
+  <inkml:trace contextRef="#ctx0" brushRef="#br0">0 1,'0'48,"0"-2,0-31,0 9,0-9,0 4,0-4,0-1,0 3,0-3,0 5,0-5,0 2,0 0,0-2,0 2</inkml:trace>
+</inkml:ink>
 </file>
 
 <file path=ppt/slideLayouts/slideLayout1.xml><?xml version="1.0" encoding="utf-8"?>
@@ -249,7 +366,7 @@
           </a:lstStyle>
           <a:p>
             <a:r>
-              <a:rPr lang="en-US" smtClean="0"/>
+              <a:rPr lang="en-US"/>
               <a:t>Click to edit Master title style</a:t>
             </a:r>
             <a:endParaRPr lang="en-US" dirty="0"/>
@@ -321,7 +438,7 @@
           </a:lstStyle>
           <a:p>
             <a:r>
-              <a:rPr lang="en-US" smtClean="0"/>
+              <a:rPr lang="en-US"/>
               <a:t>Click to edit Master subtitle style</a:t>
             </a:r>
             <a:endParaRPr lang="en-US" dirty="0"/>
@@ -345,7 +462,7 @@
           <a:p>
             <a:fld id="{B74790A8-C939-4A54-BB3B-2A2B8EA49927}" type="datetimeFigureOut">
               <a:rPr lang="tr-TR" smtClean="0"/>
-              <a:t>25.9.2018</a:t>
+              <a:t>11.11.2018</a:t>
             </a:fld>
             <a:endParaRPr lang="tr-TR"/>
           </a:p>
@@ -477,7 +594,7 @@
           <a:lstStyle/>
           <a:p>
             <a:r>
-              <a:rPr lang="en-US" smtClean="0"/>
+              <a:rPr lang="en-US"/>
               <a:t>Click to edit Master title style</a:t>
             </a:r>
             <a:endParaRPr lang="en-US" dirty="0"/>
@@ -501,35 +618,35 @@
           <a:p>
             <a:pPr lvl="0"/>
             <a:r>
-              <a:rPr lang="en-US" smtClean="0"/>
+              <a:rPr lang="en-US"/>
               <a:t>Click to edit Master text styles</a:t>
             </a:r>
           </a:p>
           <a:p>
             <a:pPr lvl="1"/>
             <a:r>
-              <a:rPr lang="en-US" smtClean="0"/>
+              <a:rPr lang="en-US"/>
               <a:t>Second level</a:t>
             </a:r>
           </a:p>
           <a:p>
             <a:pPr lvl="2"/>
             <a:r>
-              <a:rPr lang="en-US" smtClean="0"/>
+              <a:rPr lang="en-US"/>
               <a:t>Third level</a:t>
             </a:r>
           </a:p>
           <a:p>
             <a:pPr lvl="3"/>
             <a:r>
-              <a:rPr lang="en-US" smtClean="0"/>
+              <a:rPr lang="en-US"/>
               <a:t>Fourth level</a:t>
             </a:r>
           </a:p>
           <a:p>
             <a:pPr lvl="4"/>
             <a:r>
-              <a:rPr lang="en-US" smtClean="0"/>
+              <a:rPr lang="en-US"/>
               <a:t>Fifth level</a:t>
             </a:r>
             <a:endParaRPr lang="en-US" dirty="0"/>
@@ -553,7 +670,7 @@
           <a:p>
             <a:fld id="{B74790A8-C939-4A54-BB3B-2A2B8EA49927}" type="datetimeFigureOut">
               <a:rPr lang="tr-TR" smtClean="0"/>
-              <a:t>25.9.2018</a:t>
+              <a:t>11.11.2018</a:t>
             </a:fld>
             <a:endParaRPr lang="tr-TR"/>
           </a:p>
@@ -728,7 +845,7 @@
           <a:lstStyle/>
           <a:p>
             <a:r>
-              <a:rPr lang="en-US" smtClean="0"/>
+              <a:rPr lang="en-US"/>
               <a:t>Click to edit Master title style</a:t>
             </a:r>
             <a:endParaRPr lang="en-US" dirty="0"/>
@@ -757,35 +874,35 @@
           <a:p>
             <a:pPr lvl="0"/>
             <a:r>
-              <a:rPr lang="en-US" smtClean="0"/>
+              <a:rPr lang="en-US"/>
               <a:t>Click to edit Master text styles</a:t>
             </a:r>
           </a:p>
           <a:p>
             <a:pPr lvl="1"/>
             <a:r>
-              <a:rPr lang="en-US" smtClean="0"/>
+              <a:rPr lang="en-US"/>
               <a:t>Second level</a:t>
             </a:r>
           </a:p>
           <a:p>
             <a:pPr lvl="2"/>
             <a:r>
-              <a:rPr lang="en-US" smtClean="0"/>
+              <a:rPr lang="en-US"/>
               <a:t>Third level</a:t>
             </a:r>
           </a:p>
           <a:p>
             <a:pPr lvl="3"/>
             <a:r>
-              <a:rPr lang="en-US" smtClean="0"/>
+              <a:rPr lang="en-US"/>
               <a:t>Fourth level</a:t>
             </a:r>
           </a:p>
           <a:p>
             <a:pPr lvl="4"/>
             <a:r>
-              <a:rPr lang="en-US" smtClean="0"/>
+              <a:rPr lang="en-US"/>
               <a:t>Fifth level</a:t>
             </a:r>
             <a:endParaRPr lang="en-US" dirty="0"/>
@@ -809,7 +926,7 @@
           <a:p>
             <a:fld id="{B74790A8-C939-4A54-BB3B-2A2B8EA49927}" type="datetimeFigureOut">
               <a:rPr lang="tr-TR" smtClean="0"/>
-              <a:t>25.9.2018</a:t>
+              <a:t>11.11.2018</a:t>
             </a:fld>
             <a:endParaRPr lang="tr-TR"/>
           </a:p>
@@ -907,7 +1024,7 @@
           </a:lstStyle>
           <a:p>
             <a:r>
-              <a:rPr lang="en-US" smtClean="0"/>
+              <a:rPr lang="en-US"/>
               <a:t>Click to edit Master title style</a:t>
             </a:r>
             <a:endParaRPr lang="en-US" dirty="0"/>
@@ -931,35 +1048,35 @@
           <a:p>
             <a:pPr lvl="0"/>
             <a:r>
-              <a:rPr lang="en-US" smtClean="0"/>
+              <a:rPr lang="en-US"/>
               <a:t>Click to edit Master text styles</a:t>
             </a:r>
           </a:p>
           <a:p>
             <a:pPr lvl="1"/>
             <a:r>
-              <a:rPr lang="en-US" smtClean="0"/>
+              <a:rPr lang="en-US"/>
               <a:t>Second level</a:t>
             </a:r>
           </a:p>
           <a:p>
             <a:pPr lvl="2"/>
             <a:r>
-              <a:rPr lang="en-US" smtClean="0"/>
+              <a:rPr lang="en-US"/>
               <a:t>Third level</a:t>
             </a:r>
           </a:p>
           <a:p>
             <a:pPr lvl="3"/>
             <a:r>
-              <a:rPr lang="en-US" smtClean="0"/>
+              <a:rPr lang="en-US"/>
               <a:t>Fourth level</a:t>
             </a:r>
           </a:p>
           <a:p>
             <a:pPr lvl="4"/>
             <a:r>
-              <a:rPr lang="en-US" smtClean="0"/>
+              <a:rPr lang="en-US"/>
               <a:t>Fifth level</a:t>
             </a:r>
             <a:endParaRPr lang="en-US" dirty="0"/>
@@ -983,7 +1100,7 @@
           <a:p>
             <a:fld id="{B74790A8-C939-4A54-BB3B-2A2B8EA49927}" type="datetimeFigureOut">
               <a:rPr lang="tr-TR" smtClean="0"/>
-              <a:t>25.9.2018</a:t>
+              <a:t>11.11.2018</a:t>
             </a:fld>
             <a:endParaRPr lang="tr-TR"/>
           </a:p>
@@ -1182,7 +1299,7 @@
           </a:lstStyle>
           <a:p>
             <a:r>
-              <a:rPr lang="en-US" smtClean="0"/>
+              <a:rPr lang="en-US"/>
               <a:t>Click to edit Master title style</a:t>
             </a:r>
             <a:endParaRPr lang="en-US" dirty="0"/>
@@ -1303,7 +1420,7 @@
           <a:p>
             <a:pPr lvl="0"/>
             <a:r>
-              <a:rPr lang="en-US" smtClean="0"/>
+              <a:rPr lang="en-US"/>
               <a:t>Click to edit Master text styles</a:t>
             </a:r>
           </a:p>
@@ -1326,7 +1443,7 @@
           <a:p>
             <a:fld id="{B74790A8-C939-4A54-BB3B-2A2B8EA49927}" type="datetimeFigureOut">
               <a:rPr lang="tr-TR" smtClean="0"/>
-              <a:t>25.9.2018</a:t>
+              <a:t>11.11.2018</a:t>
             </a:fld>
             <a:endParaRPr lang="tr-TR"/>
           </a:p>
@@ -1463,7 +1580,7 @@
           <a:lstStyle/>
           <a:p>
             <a:r>
-              <a:rPr lang="en-US" smtClean="0"/>
+              <a:rPr lang="en-US"/>
               <a:t>Click to edit Master title style</a:t>
             </a:r>
             <a:endParaRPr lang="en-US" dirty="0"/>
@@ -1492,35 +1609,35 @@
           <a:p>
             <a:pPr lvl="0"/>
             <a:r>
-              <a:rPr lang="en-US" smtClean="0"/>
+              <a:rPr lang="en-US"/>
               <a:t>Click to edit Master text styles</a:t>
             </a:r>
           </a:p>
           <a:p>
             <a:pPr lvl="1"/>
             <a:r>
-              <a:rPr lang="en-US" smtClean="0"/>
+              <a:rPr lang="en-US"/>
               <a:t>Second level</a:t>
             </a:r>
           </a:p>
           <a:p>
             <a:pPr lvl="2"/>
             <a:r>
-              <a:rPr lang="en-US" smtClean="0"/>
+              <a:rPr lang="en-US"/>
               <a:t>Third level</a:t>
             </a:r>
           </a:p>
           <a:p>
             <a:pPr lvl="3"/>
             <a:r>
-              <a:rPr lang="en-US" smtClean="0"/>
+              <a:rPr lang="en-US"/>
               <a:t>Fourth level</a:t>
             </a:r>
           </a:p>
           <a:p>
             <a:pPr lvl="4"/>
             <a:r>
-              <a:rPr lang="en-US" smtClean="0"/>
+              <a:rPr lang="en-US"/>
               <a:t>Fifth level</a:t>
             </a:r>
             <a:endParaRPr lang="en-US" dirty="0"/>
@@ -1549,35 +1666,35 @@
           <a:p>
             <a:pPr lvl="0"/>
             <a:r>
-              <a:rPr lang="en-US" smtClean="0"/>
+              <a:rPr lang="en-US"/>
               <a:t>Click to edit Master text styles</a:t>
             </a:r>
           </a:p>
           <a:p>
             <a:pPr lvl="1"/>
             <a:r>
-              <a:rPr lang="en-US" smtClean="0"/>
+              <a:rPr lang="en-US"/>
               <a:t>Second level</a:t>
             </a:r>
           </a:p>
           <a:p>
             <a:pPr lvl="2"/>
             <a:r>
-              <a:rPr lang="en-US" smtClean="0"/>
+              <a:rPr lang="en-US"/>
               <a:t>Third level</a:t>
             </a:r>
           </a:p>
           <a:p>
             <a:pPr lvl="3"/>
             <a:r>
-              <a:rPr lang="en-US" smtClean="0"/>
+              <a:rPr lang="en-US"/>
               <a:t>Fourth level</a:t>
             </a:r>
           </a:p>
           <a:p>
             <a:pPr lvl="4"/>
             <a:r>
-              <a:rPr lang="en-US" smtClean="0"/>
+              <a:rPr lang="en-US"/>
               <a:t>Fifth level</a:t>
             </a:r>
             <a:endParaRPr lang="en-US" dirty="0"/>
@@ -1601,7 +1718,7 @@
           <a:p>
             <a:fld id="{B74790A8-C939-4A54-BB3B-2A2B8EA49927}" type="datetimeFigureOut">
               <a:rPr lang="tr-TR" smtClean="0"/>
-              <a:t>25.9.2018</a:t>
+              <a:t>11.11.2018</a:t>
             </a:fld>
             <a:endParaRPr lang="tr-TR"/>
           </a:p>
@@ -1700,7 +1817,7 @@
           <a:lstStyle/>
           <a:p>
             <a:r>
-              <a:rPr lang="en-US" smtClean="0"/>
+              <a:rPr lang="en-US"/>
               <a:t>Click to edit Master title style</a:t>
             </a:r>
             <a:endParaRPr lang="en-US" dirty="0"/>
@@ -1772,7 +1889,7 @@
           <a:p>
             <a:pPr lvl="0"/>
             <a:r>
-              <a:rPr lang="en-US" smtClean="0"/>
+              <a:rPr lang="en-US"/>
               <a:t>Click to edit Master text styles</a:t>
             </a:r>
           </a:p>
@@ -1800,35 +1917,35 @@
           <a:p>
             <a:pPr lvl="0"/>
             <a:r>
-              <a:rPr lang="en-US" smtClean="0"/>
+              <a:rPr lang="en-US"/>
               <a:t>Click to edit Master text styles</a:t>
             </a:r>
           </a:p>
           <a:p>
             <a:pPr lvl="1"/>
             <a:r>
-              <a:rPr lang="en-US" smtClean="0"/>
+              <a:rPr lang="en-US"/>
               <a:t>Second level</a:t>
             </a:r>
           </a:p>
           <a:p>
             <a:pPr lvl="2"/>
             <a:r>
-              <a:rPr lang="en-US" smtClean="0"/>
+              <a:rPr lang="en-US"/>
               <a:t>Third level</a:t>
             </a:r>
           </a:p>
           <a:p>
             <a:pPr lvl="3"/>
             <a:r>
-              <a:rPr lang="en-US" smtClean="0"/>
+              <a:rPr lang="en-US"/>
               <a:t>Fourth level</a:t>
             </a:r>
           </a:p>
           <a:p>
             <a:pPr lvl="4"/>
             <a:r>
-              <a:rPr lang="en-US" smtClean="0"/>
+              <a:rPr lang="en-US"/>
               <a:t>Fifth level</a:t>
             </a:r>
             <a:endParaRPr lang="en-US" dirty="0"/>
@@ -1900,7 +2017,7 @@
           <a:p>
             <a:pPr lvl="0"/>
             <a:r>
-              <a:rPr lang="en-US" smtClean="0"/>
+              <a:rPr lang="en-US"/>
               <a:t>Click to edit Master text styles</a:t>
             </a:r>
           </a:p>
@@ -1928,35 +2045,35 @@
           <a:p>
             <a:pPr lvl="0"/>
             <a:r>
-              <a:rPr lang="en-US" smtClean="0"/>
+              <a:rPr lang="en-US"/>
               <a:t>Click to edit Master text styles</a:t>
             </a:r>
           </a:p>
           <a:p>
             <a:pPr lvl="1"/>
             <a:r>
-              <a:rPr lang="en-US" smtClean="0"/>
+              <a:rPr lang="en-US"/>
               <a:t>Second level</a:t>
             </a:r>
           </a:p>
           <a:p>
             <a:pPr lvl="2"/>
             <a:r>
-              <a:rPr lang="en-US" smtClean="0"/>
+              <a:rPr lang="en-US"/>
               <a:t>Third level</a:t>
             </a:r>
           </a:p>
           <a:p>
             <a:pPr lvl="3"/>
             <a:r>
-              <a:rPr lang="en-US" smtClean="0"/>
+              <a:rPr lang="en-US"/>
               <a:t>Fourth level</a:t>
             </a:r>
           </a:p>
           <a:p>
             <a:pPr lvl="4"/>
             <a:r>
-              <a:rPr lang="en-US" smtClean="0"/>
+              <a:rPr lang="en-US"/>
               <a:t>Fifth level</a:t>
             </a:r>
             <a:endParaRPr lang="en-US" dirty="0"/>
@@ -1980,7 +2097,7 @@
           <a:p>
             <a:fld id="{B74790A8-C939-4A54-BB3B-2A2B8EA49927}" type="datetimeFigureOut">
               <a:rPr lang="tr-TR" smtClean="0"/>
-              <a:t>25.9.2018</a:t>
+              <a:t>11.11.2018</a:t>
             </a:fld>
             <a:endParaRPr lang="tr-TR"/>
           </a:p>
@@ -2074,7 +2191,7 @@
           <a:lstStyle/>
           <a:p>
             <a:r>
-              <a:rPr lang="en-US" smtClean="0"/>
+              <a:rPr lang="en-US"/>
               <a:t>Click to edit Master title style</a:t>
             </a:r>
             <a:endParaRPr lang="en-US" dirty="0"/>
@@ -2098,7 +2215,7 @@
           <a:p>
             <a:fld id="{B74790A8-C939-4A54-BB3B-2A2B8EA49927}" type="datetimeFigureOut">
               <a:rPr lang="tr-TR" smtClean="0"/>
-              <a:t>25.9.2018</a:t>
+              <a:t>11.11.2018</a:t>
             </a:fld>
             <a:endParaRPr lang="tr-TR"/>
           </a:p>
@@ -2269,7 +2386,7 @@
           <a:p>
             <a:fld id="{B74790A8-C939-4A54-BB3B-2A2B8EA49927}" type="datetimeFigureOut">
               <a:rPr lang="tr-TR" smtClean="0"/>
-              <a:t>25.9.2018</a:t>
+              <a:t>11.11.2018</a:t>
             </a:fld>
             <a:endParaRPr lang="tr-TR"/>
           </a:p>
@@ -2462,7 +2579,7 @@
           </a:lstStyle>
           <a:p>
             <a:r>
-              <a:rPr lang="en-US" smtClean="0"/>
+              <a:rPr lang="en-US"/>
               <a:t>Click to edit Master title style</a:t>
             </a:r>
             <a:endParaRPr lang="en-US" dirty="0"/>
@@ -2491,35 +2608,35 @@
           <a:p>
             <a:pPr lvl="0"/>
             <a:r>
-              <a:rPr lang="en-US" smtClean="0"/>
+              <a:rPr lang="en-US"/>
               <a:t>Click to edit Master text styles</a:t>
             </a:r>
           </a:p>
           <a:p>
             <a:pPr lvl="1"/>
             <a:r>
-              <a:rPr lang="en-US" smtClean="0"/>
+              <a:rPr lang="en-US"/>
               <a:t>Second level</a:t>
             </a:r>
           </a:p>
           <a:p>
             <a:pPr lvl="2"/>
             <a:r>
-              <a:rPr lang="en-US" smtClean="0"/>
+              <a:rPr lang="en-US"/>
               <a:t>Third level</a:t>
             </a:r>
           </a:p>
           <a:p>
             <a:pPr lvl="3"/>
             <a:r>
-              <a:rPr lang="en-US" smtClean="0"/>
+              <a:rPr lang="en-US"/>
               <a:t>Fourth level</a:t>
             </a:r>
           </a:p>
           <a:p>
             <a:pPr lvl="4"/>
             <a:r>
-              <a:rPr lang="en-US" smtClean="0"/>
+              <a:rPr lang="en-US"/>
               <a:t>Fifth level</a:t>
             </a:r>
             <a:endParaRPr lang="en-US" dirty="0"/>
@@ -2591,7 +2708,7 @@
           <a:p>
             <a:pPr lvl="0"/>
             <a:r>
-              <a:rPr lang="en-US" smtClean="0"/>
+              <a:rPr lang="en-US"/>
               <a:t>Click to edit Master text styles</a:t>
             </a:r>
           </a:p>
@@ -2623,7 +2740,7 @@
           <a:p>
             <a:fld id="{B74790A8-C939-4A54-BB3B-2A2B8EA49927}" type="datetimeFigureOut">
               <a:rPr lang="tr-TR" smtClean="0"/>
-              <a:t>25.9.2018</a:t>
+              <a:t>11.11.2018</a:t>
             </a:fld>
             <a:endParaRPr lang="tr-TR"/>
           </a:p>
@@ -2829,7 +2946,7 @@
           </a:lstStyle>
           <a:p>
             <a:r>
-              <a:rPr lang="en-US" smtClean="0"/>
+              <a:rPr lang="en-US"/>
               <a:t>Click to edit Master title style</a:t>
             </a:r>
             <a:endParaRPr lang="en-US" dirty="0"/>
@@ -2904,7 +3021,7 @@
           </a:lstStyle>
           <a:p>
             <a:r>
-              <a:rPr lang="en-US" smtClean="0"/>
+              <a:rPr lang="en-US"/>
               <a:t>Click icon to add picture</a:t>
             </a:r>
             <a:endParaRPr lang="en-US" dirty="0"/>
@@ -2982,7 +3099,7 @@
           <a:p>
             <a:pPr lvl="0"/>
             <a:r>
-              <a:rPr lang="en-US" smtClean="0"/>
+              <a:rPr lang="en-US"/>
               <a:t>Click to edit Master text styles</a:t>
             </a:r>
           </a:p>
@@ -3005,7 +3122,7 @@
           <a:p>
             <a:fld id="{B74790A8-C939-4A54-BB3B-2A2B8EA49927}" type="datetimeFigureOut">
               <a:rPr lang="tr-TR" smtClean="0"/>
-              <a:t>25.9.2018</a:t>
+              <a:t>11.11.2018</a:t>
             </a:fld>
             <a:endParaRPr lang="tr-TR"/>
           </a:p>
@@ -3190,7 +3307,7 @@
           <a:lstStyle/>
           <a:p>
             <a:r>
-              <a:rPr lang="en-US" smtClean="0"/>
+              <a:rPr lang="en-US"/>
               <a:t>Click to edit Master title style</a:t>
             </a:r>
             <a:endParaRPr lang="en-US" dirty="0"/>
@@ -3224,35 +3341,35 @@
           <a:p>
             <a:pPr lvl="0"/>
             <a:r>
-              <a:rPr lang="en-US" smtClean="0"/>
+              <a:rPr lang="en-US"/>
               <a:t>Click to edit Master text styles</a:t>
             </a:r>
           </a:p>
           <a:p>
             <a:pPr lvl="1"/>
             <a:r>
-              <a:rPr lang="en-US" smtClean="0"/>
+              <a:rPr lang="en-US"/>
               <a:t>Second level</a:t>
             </a:r>
           </a:p>
           <a:p>
             <a:pPr lvl="2"/>
             <a:r>
-              <a:rPr lang="en-US" smtClean="0"/>
+              <a:rPr lang="en-US"/>
               <a:t>Third level</a:t>
             </a:r>
           </a:p>
           <a:p>
             <a:pPr lvl="3"/>
             <a:r>
-              <a:rPr lang="en-US" smtClean="0"/>
+              <a:rPr lang="en-US"/>
               <a:t>Fourth level</a:t>
             </a:r>
           </a:p>
           <a:p>
             <a:pPr lvl="4"/>
             <a:r>
-              <a:rPr lang="en-US" smtClean="0"/>
+              <a:rPr lang="en-US"/>
               <a:t>Fifth level</a:t>
             </a:r>
             <a:endParaRPr lang="en-US" dirty="0"/>
@@ -3292,7 +3409,7 @@
           <a:p>
             <a:fld id="{B74790A8-C939-4A54-BB3B-2A2B8EA49927}" type="datetimeFigureOut">
               <a:rPr lang="tr-TR" smtClean="0"/>
-              <a:t>25.9.2018</a:t>
+              <a:t>11.11.2018</a:t>
             </a:fld>
             <a:endParaRPr lang="tr-TR"/>
           </a:p>
@@ -3838,18 +3955,18 @@
           <a:lstStyle/>
           <a:p>
             <a:r>
-              <a:rPr lang="tr-TR" dirty="0" smtClean="0"/>
+              <a:rPr lang="tr-TR" dirty="0"/>
               <a:t>CMPE 321 </a:t>
             </a:r>
             <a:br>
-              <a:rPr lang="tr-TR" dirty="0" smtClean="0"/>
+              <a:rPr lang="tr-TR" dirty="0"/>
             </a:br>
             <a:r>
-              <a:rPr lang="tr-TR" dirty="0" smtClean="0"/>
+              <a:rPr lang="tr-TR" dirty="0"/>
               <a:t>COMPUTER ARCHITECTURE</a:t>
             </a:r>
             <a:br>
-              <a:rPr lang="tr-TR" dirty="0" smtClean="0"/>
+              <a:rPr lang="tr-TR" dirty="0"/>
             </a:br>
             <a:endParaRPr lang="tr-TR" dirty="0"/>
           </a:p>
@@ -3871,21 +3988,21 @@
           <a:lstStyle/>
           <a:p>
             <a:r>
-              <a:rPr lang="tr-TR" dirty="0" smtClean="0"/>
+              <a:rPr lang="tr-TR" dirty="0"/>
               <a:t>TA: Selek Ceren Çelik</a:t>
             </a:r>
           </a:p>
           <a:p>
             <a:r>
-              <a:rPr lang="tr-TR" dirty="0" smtClean="0"/>
+              <a:rPr lang="tr-TR" dirty="0"/>
               <a:t>Office </a:t>
             </a:r>
             <a:r>
-              <a:rPr lang="tr-TR" dirty="0" err="1" smtClean="0"/>
+              <a:rPr lang="tr-TR" dirty="0" err="1"/>
               <a:t>LocatIon</a:t>
             </a:r>
             <a:r>
-              <a:rPr lang="tr-TR" dirty="0" smtClean="0"/>
+              <a:rPr lang="tr-TR" dirty="0"/>
               <a:t>: E3- 202</a:t>
             </a:r>
           </a:p>
@@ -3904,13 +4021,6 @@
   <p:clrMapOvr>
     <a:masterClrMapping/>
   </p:clrMapOvr>
-  <p:timing>
-    <p:tnLst>
-      <p:par>
-        <p:cTn id="1" dur="indefinite" restart="never" nodeType="tmRoot"/>
-      </p:par>
-    </p:tnLst>
-  </p:timing>
 </p:sld>
 </file>
 
@@ -3980,10 +4090,9 @@
           <a:p>
             <a:pPr algn="ctr"/>
             <a:r>
-              <a:rPr lang="tr-TR" dirty="0" smtClean="0"/>
+              <a:rPr lang="tr-TR" dirty="0"/>
               <a:t>NOTES</a:t>
             </a:r>
-            <a:endParaRPr lang="tr-TR" dirty="0"/>
           </a:p>
         </p:txBody>
       </p:sp>
@@ -4033,13 +4142,6 @@
   <p:clrMapOvr>
     <a:masterClrMapping/>
   </p:clrMapOvr>
-  <p:timing>
-    <p:tnLst>
-      <p:par>
-        <p:cTn id="1" dur="indefinite" restart="never" nodeType="tmRoot"/>
-      </p:par>
-    </p:tnLst>
-  </p:timing>
 </p:sld>
 </file>
 
@@ -4109,10 +4211,9 @@
           <a:p>
             <a:pPr algn="ctr"/>
             <a:r>
-              <a:rPr lang="tr-TR" dirty="0" smtClean="0"/>
+              <a:rPr lang="tr-TR" dirty="0"/>
               <a:t>NOTES</a:t>
             </a:r>
-            <a:endParaRPr lang="tr-TR" dirty="0"/>
           </a:p>
         </p:txBody>
       </p:sp>
@@ -4162,13 +4263,6 @@
   <p:clrMapOvr>
     <a:masterClrMapping/>
   </p:clrMapOvr>
-  <p:timing>
-    <p:tnLst>
-      <p:par>
-        <p:cTn id="1" dur="indefinite" restart="never" nodeType="tmRoot"/>
-      </p:par>
-    </p:tnLst>
-  </p:timing>
 </p:sld>
 </file>
 
@@ -4221,7 +4315,7 @@
           <a:lstStyle/>
           <a:p>
             <a:r>
-              <a:rPr lang="tr-TR" i="1" dirty="0" err="1" smtClean="0">
+              <a:rPr lang="tr-TR" i="1" dirty="0" err="1">
                 <a:solidFill>
                   <a:schemeClr val="bg1"/>
                 </a:solidFill>
@@ -4229,7 +4323,7 @@
               <a:t>Example</a:t>
             </a:r>
             <a:r>
-              <a:rPr lang="tr-TR" i="1" dirty="0" smtClean="0">
+              <a:rPr lang="tr-TR" i="1" dirty="0">
                 <a:solidFill>
                   <a:schemeClr val="bg1"/>
                 </a:solidFill>
@@ -4237,7 +4331,7 @@
               <a:t> </a:t>
             </a:r>
             <a:r>
-              <a:rPr lang="tr-TR" b="1" i="1" dirty="0" smtClean="0">
+              <a:rPr lang="tr-TR" b="1" i="1" dirty="0">
                 <a:solidFill>
                   <a:schemeClr val="bg1"/>
                 </a:solidFill>
@@ -4278,6 +4372,108 @@
           </a:prstGeom>
         </p:spPr>
       </p:pic>
+      <mc:AlternateContent xmlns:mc="http://schemas.openxmlformats.org/markup-compatibility/2006">
+        <mc:Choice xmlns:p14="http://schemas.microsoft.com/office/powerpoint/2010/main" Requires="p14">
+          <p:contentPart p14:bwMode="auto" r:id="rId3">
+            <p14:nvContentPartPr>
+              <p14:cNvPr id="2" name="Ink 1">
+                <a:extLst>
+                  <a:ext uri="{FF2B5EF4-FFF2-40B4-BE49-F238E27FC236}">
+                    <a16:creationId xmlns:a16="http://schemas.microsoft.com/office/drawing/2014/main" id="{9D97B01B-8CC4-F845-87C8-3AE0A7E19B16}"/>
+                  </a:ext>
+                </a:extLst>
+              </p14:cNvPr>
+              <p14:cNvContentPartPr/>
+              <p14:nvPr/>
+            </p14:nvContentPartPr>
+            <p14:xfrm>
+              <a:off x="1024935" y="2135623"/>
+              <a:ext cx="640080" cy="1015560"/>
+            </p14:xfrm>
+          </p:contentPart>
+        </mc:Choice>
+        <mc:Fallback>
+          <p:pic>
+            <p:nvPicPr>
+              <p:cNvPr id="2" name="Ink 1">
+                <a:extLst>
+                  <a:ext uri="{FF2B5EF4-FFF2-40B4-BE49-F238E27FC236}">
+                    <a16:creationId xmlns:a16="http://schemas.microsoft.com/office/drawing/2014/main" id="{9D97B01B-8CC4-F845-87C8-3AE0A7E19B16}"/>
+                  </a:ext>
+                </a:extLst>
+              </p:cNvPr>
+              <p:cNvPicPr/>
+              <p:nvPr/>
+            </p:nvPicPr>
+            <p:blipFill>
+              <a:blip r:embed="rId4"/>
+              <a:stretch>
+                <a:fillRect/>
+              </a:stretch>
+            </p:blipFill>
+            <p:spPr>
+              <a:xfrm>
+                <a:off x="971295" y="2027983"/>
+                <a:ext cx="747720" cy="1231200"/>
+              </a:xfrm>
+              <a:prstGeom prst="rect">
+                <a:avLst/>
+              </a:prstGeom>
+            </p:spPr>
+          </p:pic>
+        </mc:Fallback>
+      </mc:AlternateContent>
+      <mc:AlternateContent xmlns:mc="http://schemas.openxmlformats.org/markup-compatibility/2006">
+        <mc:Choice xmlns:p14="http://schemas.microsoft.com/office/powerpoint/2010/main" Requires="p14">
+          <p:contentPart p14:bwMode="auto" r:id="rId5">
+            <p14:nvContentPartPr>
+              <p14:cNvPr id="4" name="Ink 3">
+                <a:extLst>
+                  <a:ext uri="{FF2B5EF4-FFF2-40B4-BE49-F238E27FC236}">
+                    <a16:creationId xmlns:a16="http://schemas.microsoft.com/office/drawing/2014/main" id="{4C4EB8F7-2736-BF44-BF5B-2F076E32BD1B}"/>
+                  </a:ext>
+                </a:extLst>
+              </p14:cNvPr>
+              <p14:cNvContentPartPr/>
+              <p14:nvPr/>
+            </p14:nvContentPartPr>
+            <p14:xfrm>
+              <a:off x="1312935" y="3470503"/>
+              <a:ext cx="360" cy="116280"/>
+            </p14:xfrm>
+          </p:contentPart>
+        </mc:Choice>
+        <mc:Fallback>
+          <p:pic>
+            <p:nvPicPr>
+              <p:cNvPr id="4" name="Ink 3">
+                <a:extLst>
+                  <a:ext uri="{FF2B5EF4-FFF2-40B4-BE49-F238E27FC236}">
+                    <a16:creationId xmlns:a16="http://schemas.microsoft.com/office/drawing/2014/main" id="{4C4EB8F7-2736-BF44-BF5B-2F076E32BD1B}"/>
+                  </a:ext>
+                </a:extLst>
+              </p:cNvPr>
+              <p:cNvPicPr/>
+              <p:nvPr/>
+            </p:nvPicPr>
+            <p:blipFill>
+              <a:blip r:embed="rId6"/>
+              <a:stretch>
+                <a:fillRect/>
+              </a:stretch>
+            </p:blipFill>
+            <p:spPr>
+              <a:xfrm>
+                <a:off x="1258935" y="3362863"/>
+                <a:ext cx="108000" cy="331920"/>
+              </a:xfrm>
+              <a:prstGeom prst="rect">
+                <a:avLst/>
+              </a:prstGeom>
+            </p:spPr>
+          </p:pic>
+        </mc:Fallback>
+      </mc:AlternateContent>
     </p:spTree>
     <p:extLst>
       <p:ext uri="{BB962C8B-B14F-4D97-AF65-F5344CB8AC3E}">
@@ -4288,13 +4484,6 @@
   <p:clrMapOvr>
     <a:masterClrMapping/>
   </p:clrMapOvr>
-  <p:timing>
-    <p:tnLst>
-      <p:par>
-        <p:cTn id="1" dur="indefinite" restart="never" nodeType="tmRoot"/>
-      </p:par>
-    </p:tnLst>
-  </p:timing>
 </p:sld>
 </file>
 
@@ -4364,23 +4553,23 @@
           <a:p>
             <a:pPr algn="ctr"/>
             <a:r>
-              <a:rPr lang="tr-TR" dirty="0" err="1" smtClean="0"/>
+              <a:rPr lang="tr-TR" dirty="0" err="1"/>
               <a:t>Make</a:t>
             </a:r>
             <a:r>
-              <a:rPr lang="tr-TR" dirty="0" smtClean="0"/>
+              <a:rPr lang="tr-TR" dirty="0"/>
               <a:t> a </a:t>
             </a:r>
             <a:r>
-              <a:rPr lang="tr-TR" dirty="0" err="1" smtClean="0"/>
+              <a:rPr lang="tr-TR" dirty="0" err="1"/>
               <a:t>Truth</a:t>
             </a:r>
             <a:r>
-              <a:rPr lang="tr-TR" dirty="0" smtClean="0"/>
+              <a:rPr lang="tr-TR" dirty="0"/>
               <a:t> </a:t>
             </a:r>
             <a:r>
-              <a:rPr lang="tr-TR" dirty="0" err="1" smtClean="0"/>
+              <a:rPr lang="tr-TR" dirty="0" err="1"/>
               <a:t>Table</a:t>
             </a:r>
             <a:endParaRPr lang="tr-TR" dirty="0"/>
@@ -4423,13 +4612,6 @@
   <p:clrMapOvr>
     <a:masterClrMapping/>
   </p:clrMapOvr>
-  <p:timing>
-    <p:tnLst>
-      <p:par>
-        <p:cTn id="1" dur="indefinite" restart="never" nodeType="tmRoot"/>
-      </p:par>
-    </p:tnLst>
-  </p:timing>
 </p:sld>
 </file>
 
@@ -4592,7 +4774,7 @@
           <a:p>
             <a:pPr algn="ctr"/>
             <a:r>
-              <a:rPr lang="tr-TR" smtClean="0"/>
+              <a:rPr lang="tr-TR"/>
               <a:t>NOTES</a:t>
             </a:r>
             <a:endParaRPr lang="tr-TR" dirty="0"/>
@@ -4786,33 +4968,33 @@
           </a:lstStyle>
           <a:p>
             <a:pPr algn="ctr"/>
-            <a:endParaRPr lang="tr-TR" dirty="0" smtClean="0"/>
+            <a:endParaRPr lang="tr-TR" dirty="0"/>
           </a:p>
           <a:p>
             <a:pPr algn="ctr"/>
             <a:r>
-              <a:rPr lang="tr-TR" dirty="0" smtClean="0"/>
+              <a:rPr lang="tr-TR" dirty="0"/>
               <a:t>2^8  = 256</a:t>
             </a:r>
           </a:p>
           <a:p>
             <a:pPr algn="ctr"/>
             <a:r>
-              <a:rPr lang="tr-TR" dirty="0" smtClean="0"/>
+              <a:rPr lang="tr-TR" dirty="0"/>
               <a:t>2^10 = 1024 = 1 KB</a:t>
             </a:r>
           </a:p>
           <a:p>
             <a:pPr algn="ctr"/>
             <a:r>
-              <a:rPr lang="tr-TR" dirty="0" smtClean="0"/>
+              <a:rPr lang="tr-TR" dirty="0"/>
               <a:t>2^20 = 1 MB</a:t>
             </a:r>
           </a:p>
           <a:p>
             <a:pPr algn="ctr"/>
             <a:r>
-              <a:rPr lang="tr-TR" dirty="0" smtClean="0"/>
+              <a:rPr lang="tr-TR" dirty="0"/>
               <a:t>2^30 = 1 GB</a:t>
             </a:r>
           </a:p>
@@ -4821,149 +5003,149 @@
               <a:buFont typeface="Arial" panose="020B0604020202020204" pitchFamily="34" charset="0"/>
               <a:buNone/>
             </a:pPr>
-            <a:endParaRPr lang="tr-TR" dirty="0" smtClean="0"/>
+            <a:endParaRPr lang="tr-TR" dirty="0"/>
           </a:p>
           <a:p>
             <a:pPr marL="0" indent="0">
               <a:buFont typeface="Arial" panose="020B0604020202020204" pitchFamily="34" charset="0"/>
               <a:buNone/>
             </a:pPr>
-            <a:endParaRPr lang="tr-TR" dirty="0" smtClean="0"/>
-          </a:p>
-          <a:p>
-            <a:r>
-              <a:rPr lang="tr-TR" dirty="0" smtClean="0"/>
+            <a:endParaRPr lang="tr-TR" dirty="0"/>
+          </a:p>
+          <a:p>
+            <a:r>
+              <a:rPr lang="tr-TR" dirty="0"/>
               <a:t>1 </a:t>
             </a:r>
             <a:r>
-              <a:rPr lang="tr-TR" dirty="0" err="1" smtClean="0"/>
+              <a:rPr lang="tr-TR" dirty="0" err="1"/>
               <a:t>byte</a:t>
             </a:r>
             <a:r>
-              <a:rPr lang="tr-TR" dirty="0" smtClean="0"/>
+              <a:rPr lang="tr-TR" dirty="0"/>
               <a:t> = 8 </a:t>
             </a:r>
             <a:r>
-              <a:rPr lang="tr-TR" dirty="0" err="1" smtClean="0"/>
+              <a:rPr lang="tr-TR" dirty="0" err="1"/>
               <a:t>bits</a:t>
             </a:r>
-            <a:endParaRPr lang="tr-TR" dirty="0" smtClean="0"/>
-          </a:p>
-          <a:p>
-            <a:r>
-              <a:rPr lang="tr-TR" dirty="0" smtClean="0"/>
+            <a:endParaRPr lang="tr-TR" dirty="0"/>
+          </a:p>
+          <a:p>
+            <a:r>
+              <a:rPr lang="tr-TR" dirty="0"/>
               <a:t>1 </a:t>
             </a:r>
             <a:r>
-              <a:rPr lang="tr-TR" dirty="0" err="1" smtClean="0"/>
+              <a:rPr lang="tr-TR" dirty="0" err="1"/>
               <a:t>kilobyte</a:t>
             </a:r>
             <a:r>
-              <a:rPr lang="tr-TR" dirty="0" smtClean="0"/>
+              <a:rPr lang="tr-TR" dirty="0"/>
               <a:t> (K / </a:t>
             </a:r>
             <a:r>
-              <a:rPr lang="tr-TR" dirty="0" err="1" smtClean="0"/>
+              <a:rPr lang="tr-TR" dirty="0" err="1"/>
               <a:t>Kb</a:t>
             </a:r>
             <a:r>
-              <a:rPr lang="tr-TR" dirty="0" smtClean="0"/>
+              <a:rPr lang="tr-TR" dirty="0"/>
               <a:t>) = 2^10 </a:t>
             </a:r>
             <a:r>
-              <a:rPr lang="tr-TR" dirty="0" err="1" smtClean="0"/>
+              <a:rPr lang="tr-TR" dirty="0" err="1"/>
               <a:t>bytes</a:t>
             </a:r>
             <a:r>
-              <a:rPr lang="tr-TR" dirty="0" smtClean="0"/>
+              <a:rPr lang="tr-TR" dirty="0"/>
               <a:t> = 1,024 </a:t>
             </a:r>
             <a:r>
-              <a:rPr lang="tr-TR" dirty="0" err="1" smtClean="0"/>
+              <a:rPr lang="tr-TR" dirty="0" err="1"/>
               <a:t>bytes</a:t>
             </a:r>
-            <a:endParaRPr lang="tr-TR" dirty="0" smtClean="0"/>
-          </a:p>
-          <a:p>
-            <a:r>
-              <a:rPr lang="tr-TR" dirty="0" smtClean="0"/>
+            <a:endParaRPr lang="tr-TR" dirty="0"/>
+          </a:p>
+          <a:p>
+            <a:r>
+              <a:rPr lang="tr-TR" dirty="0"/>
               <a:t>1 </a:t>
             </a:r>
             <a:r>
-              <a:rPr lang="tr-TR" dirty="0" err="1" smtClean="0"/>
+              <a:rPr lang="tr-TR" dirty="0" err="1"/>
               <a:t>megabyte</a:t>
             </a:r>
             <a:r>
-              <a:rPr lang="tr-TR" dirty="0" smtClean="0"/>
+              <a:rPr lang="tr-TR" dirty="0"/>
               <a:t> (M / MB) = 2^20 </a:t>
             </a:r>
             <a:r>
-              <a:rPr lang="tr-TR" dirty="0" err="1" smtClean="0"/>
+              <a:rPr lang="tr-TR" dirty="0" err="1"/>
               <a:t>bytes</a:t>
             </a:r>
             <a:r>
-              <a:rPr lang="tr-TR" dirty="0" smtClean="0"/>
+              <a:rPr lang="tr-TR" dirty="0"/>
               <a:t> = 1,048,576 </a:t>
             </a:r>
             <a:r>
-              <a:rPr lang="tr-TR" dirty="0" err="1" smtClean="0"/>
+              <a:rPr lang="tr-TR" dirty="0" err="1"/>
               <a:t>bytes</a:t>
             </a:r>
-            <a:endParaRPr lang="tr-TR" dirty="0" smtClean="0"/>
-          </a:p>
-          <a:p>
-            <a:r>
-              <a:rPr lang="tr-TR" dirty="0" smtClean="0"/>
+            <a:endParaRPr lang="tr-TR" dirty="0"/>
+          </a:p>
+          <a:p>
+            <a:r>
+              <a:rPr lang="tr-TR" dirty="0"/>
               <a:t>1 </a:t>
             </a:r>
             <a:r>
-              <a:rPr lang="tr-TR" dirty="0" err="1" smtClean="0"/>
+              <a:rPr lang="tr-TR" dirty="0" err="1"/>
               <a:t>gigabyte</a:t>
             </a:r>
             <a:r>
-              <a:rPr lang="tr-TR" dirty="0" smtClean="0"/>
+              <a:rPr lang="tr-TR" dirty="0"/>
               <a:t> (G / GB) = 2^30 </a:t>
             </a:r>
             <a:r>
-              <a:rPr lang="tr-TR" dirty="0" err="1" smtClean="0"/>
+              <a:rPr lang="tr-TR" dirty="0" err="1"/>
               <a:t>bytes</a:t>
             </a:r>
             <a:r>
-              <a:rPr lang="tr-TR" dirty="0" smtClean="0"/>
+              <a:rPr lang="tr-TR" dirty="0"/>
               <a:t> = 1,073,741,824 </a:t>
             </a:r>
             <a:r>
-              <a:rPr lang="tr-TR" dirty="0" err="1" smtClean="0"/>
+              <a:rPr lang="tr-TR" dirty="0" err="1"/>
               <a:t>bytes</a:t>
             </a:r>
-            <a:endParaRPr lang="tr-TR" dirty="0" smtClean="0"/>
-          </a:p>
-          <a:p>
-            <a:r>
-              <a:rPr lang="tr-TR" dirty="0" smtClean="0"/>
+            <a:endParaRPr lang="tr-TR" dirty="0"/>
+          </a:p>
+          <a:p>
+            <a:r>
+              <a:rPr lang="tr-TR" dirty="0"/>
               <a:t>1 </a:t>
             </a:r>
             <a:r>
-              <a:rPr lang="tr-TR" dirty="0" err="1" smtClean="0"/>
+              <a:rPr lang="tr-TR" dirty="0" err="1"/>
               <a:t>terabyte</a:t>
             </a:r>
             <a:r>
-              <a:rPr lang="tr-TR" dirty="0" smtClean="0"/>
+              <a:rPr lang="tr-TR" dirty="0"/>
               <a:t> (T / TB) = 2^40 </a:t>
             </a:r>
             <a:r>
-              <a:rPr lang="tr-TR" dirty="0" err="1" smtClean="0"/>
+              <a:rPr lang="tr-TR" dirty="0" err="1"/>
               <a:t>bytes</a:t>
             </a:r>
             <a:r>
-              <a:rPr lang="tr-TR" dirty="0" smtClean="0"/>
+              <a:rPr lang="tr-TR" dirty="0"/>
               <a:t> = 1,099,511,627,776 </a:t>
             </a:r>
             <a:r>
-              <a:rPr lang="tr-TR" dirty="0" err="1" smtClean="0"/>
+              <a:rPr lang="tr-TR" dirty="0" err="1"/>
               <a:t>bytes</a:t>
             </a:r>
-            <a:endParaRPr lang="tr-TR" dirty="0" smtClean="0"/>
+            <a:endParaRPr lang="tr-TR" dirty="0"/>
           </a:p>
           <a:p>
             <a:pPr marL="0" indent="0">
@@ -4984,13 +5166,6 @@
   <p:clrMapOvr>
     <a:masterClrMapping/>
   </p:clrMapOvr>
-  <p:timing>
-    <p:tnLst>
-      <p:par>
-        <p:cTn id="1" dur="indefinite" restart="never" nodeType="tmRoot"/>
-      </p:par>
-    </p:tnLst>
-  </p:timing>
 </p:sld>
 </file>
 
@@ -5035,18 +5210,13 @@
           <a:lstStyle/>
           <a:p>
             <a:r>
-              <a:rPr lang="tr-TR" i="1" dirty="0" smtClean="0">
+              <a:rPr lang="tr-TR" i="1" dirty="0">
                 <a:solidFill>
                   <a:schemeClr val="bg1"/>
                 </a:solidFill>
               </a:rPr>
               <a:t>Example of Conversion</a:t>
             </a:r>
-            <a:endParaRPr lang="tr-TR" i="1" dirty="0">
-              <a:solidFill>
-                <a:schemeClr val="bg1"/>
-              </a:solidFill>
-            </a:endParaRPr>
           </a:p>
         </p:txBody>
       </p:sp>
@@ -5110,13 +5280,6 @@
   <p:clrMapOvr>
     <a:masterClrMapping/>
   </p:clrMapOvr>
-  <p:timing>
-    <p:tnLst>
-      <p:par>
-        <p:cTn id="1" dur="indefinite" restart="never" nodeType="tmRoot"/>
-      </p:par>
-    </p:tnLst>
-  </p:timing>
 </p:sld>
 </file>
 
@@ -5190,7 +5353,7 @@
           </a:lstStyle>
           <a:p>
             <a:r>
-              <a:rPr lang="tr-TR" i="1" dirty="0" smtClean="0">
+              <a:rPr lang="tr-TR" i="1" dirty="0">
                 <a:solidFill>
                   <a:schemeClr val="bg1"/>
                 </a:solidFill>
@@ -5198,7 +5361,7 @@
               <a:t>QUESTION</a:t>
             </a:r>
             <a:r>
-              <a:rPr lang="tr-TR" b="1" i="1" dirty="0" smtClean="0">
+              <a:rPr lang="tr-TR" b="1" i="1" dirty="0">
                 <a:solidFill>
                   <a:schemeClr val="bg1"/>
                 </a:solidFill>
@@ -5250,13 +5413,6 @@
   <p:clrMapOvr>
     <a:masterClrMapping/>
   </p:clrMapOvr>
-  <p:timing>
-    <p:tnLst>
-      <p:par>
-        <p:cTn id="1" dur="indefinite" restart="never" nodeType="tmRoot"/>
-      </p:par>
-    </p:tnLst>
-  </p:timing>
 </p:sld>
 </file>
 
@@ -5309,7 +5465,7 @@
           <a:lstStyle/>
           <a:p>
             <a:r>
-              <a:rPr lang="tr-TR" i="1" dirty="0" err="1" smtClean="0">
+              <a:rPr lang="tr-TR" i="1" dirty="0" err="1">
                 <a:solidFill>
                   <a:schemeClr val="bg1"/>
                 </a:solidFill>
@@ -5317,7 +5473,7 @@
               <a:t>Answer</a:t>
             </a:r>
             <a:r>
-              <a:rPr lang="tr-TR" b="1" i="1" dirty="0" smtClean="0">
+              <a:rPr lang="tr-TR" b="1" i="1" dirty="0">
                 <a:solidFill>
                   <a:schemeClr val="bg1"/>
                 </a:solidFill>
@@ -5370,13 +5526,6 @@
   <p:clrMapOvr>
     <a:masterClrMapping/>
   </p:clrMapOvr>
-  <p:timing>
-    <p:tnLst>
-      <p:par>
-        <p:cTn id="1" dur="indefinite" restart="never" nodeType="tmRoot"/>
-      </p:par>
-    </p:tnLst>
-  </p:timing>
 </p:sld>
 </file>
 
@@ -5429,7 +5578,7 @@
           <a:lstStyle/>
           <a:p>
             <a:r>
-              <a:rPr lang="tr-TR" i="1" dirty="0" err="1" smtClean="0">
+              <a:rPr lang="tr-TR" i="1" dirty="0" err="1">
                 <a:solidFill>
                   <a:schemeClr val="bg1"/>
                 </a:solidFill>
@@ -5437,7 +5586,7 @@
               <a:t>Question</a:t>
             </a:r>
             <a:r>
-              <a:rPr lang="tr-TR" b="1" i="1" dirty="0" smtClean="0">
+              <a:rPr lang="tr-TR" b="1" i="1" dirty="0">
                 <a:solidFill>
                   <a:schemeClr val="bg1"/>
                 </a:solidFill>
@@ -5491,13 +5640,6 @@
   <p:clrMapOvr>
     <a:masterClrMapping/>
   </p:clrMapOvr>
-  <p:timing>
-    <p:tnLst>
-      <p:par>
-        <p:cTn id="1" dur="indefinite" restart="never" nodeType="tmRoot"/>
-      </p:par>
-    </p:tnLst>
-  </p:timing>
 </p:sld>
 </file>
 
@@ -5550,7 +5692,7 @@
           <a:lstStyle/>
           <a:p>
             <a:r>
-              <a:rPr lang="tr-TR" i="1" dirty="0" err="1" smtClean="0">
+              <a:rPr lang="tr-TR" i="1" dirty="0" err="1">
                 <a:solidFill>
                   <a:schemeClr val="bg1"/>
                 </a:solidFill>
@@ -5558,7 +5700,7 @@
               <a:t>Answer</a:t>
             </a:r>
             <a:r>
-              <a:rPr lang="tr-TR" b="1" i="1" dirty="0" smtClean="0">
+              <a:rPr lang="tr-TR" b="1" i="1" dirty="0">
                 <a:solidFill>
                   <a:schemeClr val="bg1"/>
                 </a:solidFill>
@@ -5612,13 +5754,6 @@
   <p:clrMapOvr>
     <a:masterClrMapping/>
   </p:clrMapOvr>
-  <p:timing>
-    <p:tnLst>
-      <p:par>
-        <p:cTn id="1" dur="indefinite" restart="never" nodeType="tmRoot"/>
-      </p:par>
-    </p:tnLst>
-  </p:timing>
 </p:sld>
 </file>
 
@@ -5688,10 +5823,9 @@
           <a:p>
             <a:pPr algn="ctr"/>
             <a:r>
-              <a:rPr lang="tr-TR" dirty="0" smtClean="0"/>
+              <a:rPr lang="tr-TR" dirty="0"/>
               <a:t>NOTES</a:t>
             </a:r>
-            <a:endParaRPr lang="tr-TR" dirty="0"/>
           </a:p>
         </p:txBody>
       </p:sp>
@@ -5741,13 +5875,6 @@
   <p:clrMapOvr>
     <a:masterClrMapping/>
   </p:clrMapOvr>
-  <p:timing>
-    <p:tnLst>
-      <p:par>
-        <p:cTn id="1" dur="indefinite" restart="never" nodeType="tmRoot"/>
-      </p:par>
-    </p:tnLst>
-  </p:timing>
 </p:sld>
 </file>
 
@@ -5817,10 +5944,9 @@
           <a:p>
             <a:pPr algn="ctr"/>
             <a:r>
-              <a:rPr lang="tr-TR" dirty="0" smtClean="0"/>
+              <a:rPr lang="tr-TR" dirty="0"/>
               <a:t>NOTES</a:t>
             </a:r>
-            <a:endParaRPr lang="tr-TR" dirty="0"/>
           </a:p>
         </p:txBody>
       </p:sp>
@@ -5860,6 +5986,108 @@
           </a:ln>
         </p:spPr>
       </p:pic>
+      <mc:AlternateContent xmlns:mc="http://schemas.openxmlformats.org/markup-compatibility/2006">
+        <mc:Choice xmlns:p14="http://schemas.microsoft.com/office/powerpoint/2010/main" Requires="p14">
+          <p:contentPart p14:bwMode="auto" r:id="rId3">
+            <p14:nvContentPartPr>
+              <p14:cNvPr id="6" name="Ink 5">
+                <a:extLst>
+                  <a:ext uri="{FF2B5EF4-FFF2-40B4-BE49-F238E27FC236}">
+                    <a16:creationId xmlns:a16="http://schemas.microsoft.com/office/drawing/2014/main" id="{239E5525-B6F5-2A49-B263-7E2DC553C175}"/>
+                  </a:ext>
+                </a:extLst>
+              </p14:cNvPr>
+              <p14:cNvContentPartPr/>
+              <p14:nvPr/>
+            </p14:nvContentPartPr>
+            <p14:xfrm>
+              <a:off x="3149655" y="4990636"/>
+              <a:ext cx="1341720" cy="360"/>
+            </p14:xfrm>
+          </p:contentPart>
+        </mc:Choice>
+        <mc:Fallback>
+          <p:pic>
+            <p:nvPicPr>
+              <p:cNvPr id="6" name="Ink 5">
+                <a:extLst>
+                  <a:ext uri="{FF2B5EF4-FFF2-40B4-BE49-F238E27FC236}">
+                    <a16:creationId xmlns:a16="http://schemas.microsoft.com/office/drawing/2014/main" id="{239E5525-B6F5-2A49-B263-7E2DC553C175}"/>
+                  </a:ext>
+                </a:extLst>
+              </p:cNvPr>
+              <p:cNvPicPr/>
+              <p:nvPr/>
+            </p:nvPicPr>
+            <p:blipFill>
+              <a:blip r:embed="rId4"/>
+              <a:stretch>
+                <a:fillRect/>
+              </a:stretch>
+            </p:blipFill>
+            <p:spPr>
+              <a:xfrm>
+                <a:off x="3095655" y="4882636"/>
+                <a:ext cx="1449360" cy="216000"/>
+              </a:xfrm>
+              <a:prstGeom prst="rect">
+                <a:avLst/>
+              </a:prstGeom>
+            </p:spPr>
+          </p:pic>
+        </mc:Fallback>
+      </mc:AlternateContent>
+      <mc:AlternateContent xmlns:mc="http://schemas.openxmlformats.org/markup-compatibility/2006">
+        <mc:Choice xmlns:p14="http://schemas.microsoft.com/office/powerpoint/2010/main" Requires="p14">
+          <p:contentPart p14:bwMode="auto" r:id="rId5">
+            <p14:nvContentPartPr>
+              <p14:cNvPr id="7" name="Ink 6">
+                <a:extLst>
+                  <a:ext uri="{FF2B5EF4-FFF2-40B4-BE49-F238E27FC236}">
+                    <a16:creationId xmlns:a16="http://schemas.microsoft.com/office/drawing/2014/main" id="{4EF473C5-B3EC-4C4F-A03E-2F0229F029E0}"/>
+                  </a:ext>
+                </a:extLst>
+              </p14:cNvPr>
+              <p14:cNvContentPartPr/>
+              <p14:nvPr/>
+            </p14:nvContentPartPr>
+            <p14:xfrm>
+              <a:off x="6139815" y="4975876"/>
+              <a:ext cx="973800" cy="32040"/>
+            </p14:xfrm>
+          </p:contentPart>
+        </mc:Choice>
+        <mc:Fallback>
+          <p:pic>
+            <p:nvPicPr>
+              <p:cNvPr id="7" name="Ink 6">
+                <a:extLst>
+                  <a:ext uri="{FF2B5EF4-FFF2-40B4-BE49-F238E27FC236}">
+                    <a16:creationId xmlns:a16="http://schemas.microsoft.com/office/drawing/2014/main" id="{4EF473C5-B3EC-4C4F-A03E-2F0229F029E0}"/>
+                  </a:ext>
+                </a:extLst>
+              </p:cNvPr>
+              <p:cNvPicPr/>
+              <p:nvPr/>
+            </p:nvPicPr>
+            <p:blipFill>
+              <a:blip r:embed="rId6"/>
+              <a:stretch>
+                <a:fillRect/>
+              </a:stretch>
+            </p:blipFill>
+            <p:spPr>
+              <a:xfrm>
+                <a:off x="6086175" y="4867876"/>
+                <a:ext cx="1081440" cy="247680"/>
+              </a:xfrm>
+              <a:prstGeom prst="rect">
+                <a:avLst/>
+              </a:prstGeom>
+            </p:spPr>
+          </p:pic>
+        </mc:Fallback>
+      </mc:AlternateContent>
     </p:spTree>
     <p:extLst>
       <p:ext uri="{BB962C8B-B14F-4D97-AF65-F5344CB8AC3E}">
@@ -5870,13 +6098,6 @@
   <p:clrMapOvr>
     <a:masterClrMapping/>
   </p:clrMapOvr>
-  <p:timing>
-    <p:tnLst>
-      <p:par>
-        <p:cTn id="1" dur="indefinite" restart="never" nodeType="tmRoot"/>
-      </p:par>
-    </p:tnLst>
-  </p:timing>
 </p:sld>
 </file>
 

</xml_diff>